<commit_message>
costanzo perturbation space analysed
</commit_message>
<xml_diff>
--- a/plots/BPS_fitness/BPS figure 3.pptx
+++ b/plots/BPS_fitness/BPS figure 3.pptx
@@ -104,7 +104,145 @@
       </a:defRPr>
     </a:lvl9pPr>
   </p:defaultTextStyle>
+  <p:extLst>
+    <p:ext uri="{EFAFB233-063F-42B5-8137-9DF3F51BA10A}">
+      <p15:sldGuideLst xmlns:p15="http://schemas.microsoft.com/office/powerpoint/2012/main"/>
+    </p:ext>
+  </p:extLst>
 </p:presentation>
+</file>
+
+<file path=ppt/revisionInfo.xml><?xml version="1.0" encoding="utf-8"?>
+<p1510:revInfo xmlns:a="http://schemas.openxmlformats.org/drawingml/2006/main" xmlns:r="http://schemas.openxmlformats.org/officeDocument/2006/relationships" xmlns:p1510="http://schemas.microsoft.com/office/powerpoint/2015/10/main">
+  <p1510:revLst>
+    <p1510:client id="{94594038-0F2B-0344-BFD0-4E9AB72D7A9C}" v="3" dt="2023-08-04T14:46:42.543"/>
+  </p1510:revLst>
+</p1510:revInfo>
+</file>
+
+<file path=ppt/changesInfos/changesInfo1.xml><?xml version="1.0" encoding="utf-8"?>
+<pc:chgInfo xmlns:a="http://schemas.openxmlformats.org/drawingml/2006/main" xmlns:r="http://schemas.openxmlformats.org/officeDocument/2006/relationships" xmlns:ac="http://schemas.microsoft.com/office/drawing/2013/main/command" xmlns:pc="http://schemas.microsoft.com/office/powerpoint/2013/main/command">
+  <pc:docChgLst>
+    <pc:chgData name="Cecilia Trivellin" userId="77962b75-de7c-4c40-bb6b-4b915835e2f5" providerId="ADAL" clId="{94594038-0F2B-0344-BFD0-4E9AB72D7A9C}"/>
+    <pc:docChg chg="undo custSel modSld">
+      <pc:chgData name="Cecilia Trivellin" userId="77962b75-de7c-4c40-bb6b-4b915835e2f5" providerId="ADAL" clId="{94594038-0F2B-0344-BFD0-4E9AB72D7A9C}" dt="2023-08-04T14:47:29.490" v="22" actId="1076"/>
+      <pc:docMkLst>
+        <pc:docMk/>
+      </pc:docMkLst>
+      <pc:sldChg chg="addSp delSp modSp mod">
+        <pc:chgData name="Cecilia Trivellin" userId="77962b75-de7c-4c40-bb6b-4b915835e2f5" providerId="ADAL" clId="{94594038-0F2B-0344-BFD0-4E9AB72D7A9C}" dt="2023-08-04T14:47:29.490" v="22" actId="1076"/>
+        <pc:sldMkLst>
+          <pc:docMk/>
+          <pc:sldMk cId="1519280275" sldId="257"/>
+        </pc:sldMkLst>
+        <pc:spChg chg="add mod">
+          <ac:chgData name="Cecilia Trivellin" userId="77962b75-de7c-4c40-bb6b-4b915835e2f5" providerId="ADAL" clId="{94594038-0F2B-0344-BFD0-4E9AB72D7A9C}" dt="2023-08-04T14:46:06.858" v="1"/>
+          <ac:spMkLst>
+            <pc:docMk/>
+            <pc:sldMk cId="1519280275" sldId="257"/>
+            <ac:spMk id="2" creationId="{D45A72B1-F09E-1229-080E-261C06F12AF1}"/>
+          </ac:spMkLst>
+        </pc:spChg>
+        <pc:spChg chg="add mod">
+          <ac:chgData name="Cecilia Trivellin" userId="77962b75-de7c-4c40-bb6b-4b915835e2f5" providerId="ADAL" clId="{94594038-0F2B-0344-BFD0-4E9AB72D7A9C}" dt="2023-08-04T14:46:06.858" v="1"/>
+          <ac:spMkLst>
+            <pc:docMk/>
+            <pc:sldMk cId="1519280275" sldId="257"/>
+            <ac:spMk id="3" creationId="{3857E740-F449-4C25-0C7A-02E0BF20AB3E}"/>
+          </ac:spMkLst>
+        </pc:spChg>
+        <pc:spChg chg="add mod">
+          <ac:chgData name="Cecilia Trivellin" userId="77962b75-de7c-4c40-bb6b-4b915835e2f5" providerId="ADAL" clId="{94594038-0F2B-0344-BFD0-4E9AB72D7A9C}" dt="2023-08-04T14:46:06.858" v="1"/>
+          <ac:spMkLst>
+            <pc:docMk/>
+            <pc:sldMk cId="1519280275" sldId="257"/>
+            <ac:spMk id="4" creationId="{BABD0BC2-46BA-FA4E-AE19-E555B721AA7F}"/>
+          </ac:spMkLst>
+        </pc:spChg>
+        <pc:spChg chg="add mod">
+          <ac:chgData name="Cecilia Trivellin" userId="77962b75-de7c-4c40-bb6b-4b915835e2f5" providerId="ADAL" clId="{94594038-0F2B-0344-BFD0-4E9AB72D7A9C}" dt="2023-08-04T14:46:06.858" v="1"/>
+          <ac:spMkLst>
+            <pc:docMk/>
+            <pc:sldMk cId="1519280275" sldId="257"/>
+            <ac:spMk id="6" creationId="{02B19EA6-0C8A-8231-C3EC-8E1E55F52666}"/>
+          </ac:spMkLst>
+        </pc:spChg>
+        <pc:spChg chg="mod">
+          <ac:chgData name="Cecilia Trivellin" userId="77962b75-de7c-4c40-bb6b-4b915835e2f5" providerId="ADAL" clId="{94594038-0F2B-0344-BFD0-4E9AB72D7A9C}" dt="2023-08-04T14:47:29.490" v="22" actId="1076"/>
+          <ac:spMkLst>
+            <pc:docMk/>
+            <pc:sldMk cId="1519280275" sldId="257"/>
+            <ac:spMk id="9" creationId="{115FD552-59DB-CA57-1018-A7DE71CF4426}"/>
+          </ac:spMkLst>
+        </pc:spChg>
+        <pc:spChg chg="add mod">
+          <ac:chgData name="Cecilia Trivellin" userId="77962b75-de7c-4c40-bb6b-4b915835e2f5" providerId="ADAL" clId="{94594038-0F2B-0344-BFD0-4E9AB72D7A9C}" dt="2023-08-04T14:46:06.858" v="1"/>
+          <ac:spMkLst>
+            <pc:docMk/>
+            <pc:sldMk cId="1519280275" sldId="257"/>
+            <ac:spMk id="10" creationId="{CB68924B-507D-6D50-CF7C-ABD9057C0FBC}"/>
+          </ac:spMkLst>
+        </pc:spChg>
+        <pc:spChg chg="add mod">
+          <ac:chgData name="Cecilia Trivellin" userId="77962b75-de7c-4c40-bb6b-4b915835e2f5" providerId="ADAL" clId="{94594038-0F2B-0344-BFD0-4E9AB72D7A9C}" dt="2023-08-04T14:46:06.858" v="1"/>
+          <ac:spMkLst>
+            <pc:docMk/>
+            <pc:sldMk cId="1519280275" sldId="257"/>
+            <ac:spMk id="11" creationId="{FB8D91D6-2443-B48E-02E1-E5E098B98D8A}"/>
+          </ac:spMkLst>
+        </pc:spChg>
+        <pc:spChg chg="add mod">
+          <ac:chgData name="Cecilia Trivellin" userId="77962b75-de7c-4c40-bb6b-4b915835e2f5" providerId="ADAL" clId="{94594038-0F2B-0344-BFD0-4E9AB72D7A9C}" dt="2023-08-04T14:46:06.858" v="1"/>
+          <ac:spMkLst>
+            <pc:docMk/>
+            <pc:sldMk cId="1519280275" sldId="257"/>
+            <ac:spMk id="12" creationId="{A8CD4B46-A735-6B7B-9FF5-6CB605A00BB1}"/>
+          </ac:spMkLst>
+        </pc:spChg>
+        <pc:spChg chg="add mod">
+          <ac:chgData name="Cecilia Trivellin" userId="77962b75-de7c-4c40-bb6b-4b915835e2f5" providerId="ADAL" clId="{94594038-0F2B-0344-BFD0-4E9AB72D7A9C}" dt="2023-08-04T14:46:06.858" v="1"/>
+          <ac:spMkLst>
+            <pc:docMk/>
+            <pc:sldMk cId="1519280275" sldId="257"/>
+            <ac:spMk id="13" creationId="{D681817D-6669-9E93-2EBB-99D6AFAE06D6}"/>
+          </ac:spMkLst>
+        </pc:spChg>
+        <pc:picChg chg="add del">
+          <ac:chgData name="Cecilia Trivellin" userId="77962b75-de7c-4c40-bb6b-4b915835e2f5" providerId="ADAL" clId="{94594038-0F2B-0344-BFD0-4E9AB72D7A9C}" dt="2023-08-04T14:46:53.680" v="12" actId="478"/>
+          <ac:picMkLst>
+            <pc:docMk/>
+            <pc:sldMk cId="1519280275" sldId="257"/>
+            <ac:picMk id="5" creationId="{96C93B6D-8386-4E8B-B108-CCD626D6BA9E}"/>
+          </ac:picMkLst>
+        </pc:picChg>
+        <pc:picChg chg="del">
+          <ac:chgData name="Cecilia Trivellin" userId="77962b75-de7c-4c40-bb6b-4b915835e2f5" providerId="ADAL" clId="{94594038-0F2B-0344-BFD0-4E9AB72D7A9C}" dt="2023-08-04T14:45:56.728" v="0" actId="478"/>
+          <ac:picMkLst>
+            <pc:docMk/>
+            <pc:sldMk cId="1519280275" sldId="257"/>
+            <ac:picMk id="7" creationId="{B983555D-C4C1-4ED1-C834-02D1AFE82779}"/>
+          </ac:picMkLst>
+        </pc:picChg>
+        <pc:picChg chg="add mod modCrop">
+          <ac:chgData name="Cecilia Trivellin" userId="77962b75-de7c-4c40-bb6b-4b915835e2f5" providerId="ADAL" clId="{94594038-0F2B-0344-BFD0-4E9AB72D7A9C}" dt="2023-08-04T14:46:29.565" v="7" actId="14100"/>
+          <ac:picMkLst>
+            <pc:docMk/>
+            <pc:sldMk cId="1519280275" sldId="257"/>
+            <ac:picMk id="15" creationId="{887A525F-6CE8-90C6-7130-D68CCA53E1B9}"/>
+          </ac:picMkLst>
+        </pc:picChg>
+        <pc:picChg chg="add mod modCrop">
+          <ac:chgData name="Cecilia Trivellin" userId="77962b75-de7c-4c40-bb6b-4b915835e2f5" providerId="ADAL" clId="{94594038-0F2B-0344-BFD0-4E9AB72D7A9C}" dt="2023-08-04T14:47:21.002" v="19" actId="1076"/>
+          <ac:picMkLst>
+            <pc:docMk/>
+            <pc:sldMk cId="1519280275" sldId="257"/>
+            <ac:picMk id="17" creationId="{250CF919-8366-1AFF-12B2-4D2192EC2603}"/>
+          </ac:picMkLst>
+        </pc:picChg>
+      </pc:sldChg>
+    </pc:docChg>
+  </pc:docChgLst>
+</pc:chgInfo>
 </file>
 
 <file path=ppt/slideLayouts/slideLayout1.xml><?xml version="1.0" encoding="utf-8"?>
@@ -238,7 +376,7 @@
           <a:p>
             <a:fld id="{3E707562-369E-CB40-B6E0-533D322EC924}" type="datetimeFigureOut">
               <a:rPr lang="en-US" smtClean="0"/>
-              <a:t>7/14/23</a:t>
+              <a:t>8/4/23</a:t>
             </a:fld>
             <a:endParaRPr lang="en-US"/>
           </a:p>
@@ -408,7 +546,7 @@
           <a:p>
             <a:fld id="{3E707562-369E-CB40-B6E0-533D322EC924}" type="datetimeFigureOut">
               <a:rPr lang="en-US" smtClean="0"/>
-              <a:t>7/14/23</a:t>
+              <a:t>8/4/23</a:t>
             </a:fld>
             <a:endParaRPr lang="en-US"/>
           </a:p>
@@ -588,7 +726,7 @@
           <a:p>
             <a:fld id="{3E707562-369E-CB40-B6E0-533D322EC924}" type="datetimeFigureOut">
               <a:rPr lang="en-US" smtClean="0"/>
-              <a:t>7/14/23</a:t>
+              <a:t>8/4/23</a:t>
             </a:fld>
             <a:endParaRPr lang="en-US"/>
           </a:p>
@@ -758,7 +896,7 @@
           <a:p>
             <a:fld id="{3E707562-369E-CB40-B6E0-533D322EC924}" type="datetimeFigureOut">
               <a:rPr lang="en-US" smtClean="0"/>
-              <a:t>7/14/23</a:t>
+              <a:t>8/4/23</a:t>
             </a:fld>
             <a:endParaRPr lang="en-US"/>
           </a:p>
@@ -1002,7 +1140,7 @@
           <a:p>
             <a:fld id="{3E707562-369E-CB40-B6E0-533D322EC924}" type="datetimeFigureOut">
               <a:rPr lang="en-US" smtClean="0"/>
-              <a:t>7/14/23</a:t>
+              <a:t>8/4/23</a:t>
             </a:fld>
             <a:endParaRPr lang="en-US"/>
           </a:p>
@@ -1234,7 +1372,7 @@
           <a:p>
             <a:fld id="{3E707562-369E-CB40-B6E0-533D322EC924}" type="datetimeFigureOut">
               <a:rPr lang="en-US" smtClean="0"/>
-              <a:t>7/14/23</a:t>
+              <a:t>8/4/23</a:t>
             </a:fld>
             <a:endParaRPr lang="en-US"/>
           </a:p>
@@ -1601,7 +1739,7 @@
           <a:p>
             <a:fld id="{3E707562-369E-CB40-B6E0-533D322EC924}" type="datetimeFigureOut">
               <a:rPr lang="en-US" smtClean="0"/>
-              <a:t>7/14/23</a:t>
+              <a:t>8/4/23</a:t>
             </a:fld>
             <a:endParaRPr lang="en-US"/>
           </a:p>
@@ -1719,7 +1857,7 @@
           <a:p>
             <a:fld id="{3E707562-369E-CB40-B6E0-533D322EC924}" type="datetimeFigureOut">
               <a:rPr lang="en-US" smtClean="0"/>
-              <a:t>7/14/23</a:t>
+              <a:t>8/4/23</a:t>
             </a:fld>
             <a:endParaRPr lang="en-US"/>
           </a:p>
@@ -1814,7 +1952,7 @@
           <a:p>
             <a:fld id="{3E707562-369E-CB40-B6E0-533D322EC924}" type="datetimeFigureOut">
               <a:rPr lang="en-US" smtClean="0"/>
-              <a:t>7/14/23</a:t>
+              <a:t>8/4/23</a:t>
             </a:fld>
             <a:endParaRPr lang="en-US"/>
           </a:p>
@@ -2091,7 +2229,7 @@
           <a:p>
             <a:fld id="{3E707562-369E-CB40-B6E0-533D322EC924}" type="datetimeFigureOut">
               <a:rPr lang="en-US" smtClean="0"/>
-              <a:t>7/14/23</a:t>
+              <a:t>8/4/23</a:t>
             </a:fld>
             <a:endParaRPr lang="en-US"/>
           </a:p>
@@ -2348,7 +2486,7 @@
           <a:p>
             <a:fld id="{3E707562-369E-CB40-B6E0-533D322EC924}" type="datetimeFigureOut">
               <a:rPr lang="en-US" smtClean="0"/>
-              <a:t>7/14/23</a:t>
+              <a:t>8/4/23</a:t>
             </a:fld>
             <a:endParaRPr lang="en-US"/>
           </a:p>
@@ -2561,7 +2699,7 @@
           <a:p>
             <a:fld id="{3E707562-369E-CB40-B6E0-533D322EC924}" type="datetimeFigureOut">
               <a:rPr lang="en-US" smtClean="0"/>
-              <a:t>7/14/23</a:t>
+              <a:t>8/4/23</a:t>
             </a:fld>
             <a:endParaRPr lang="en-US"/>
           </a:p>
@@ -2966,64 +3104,6 @@
           <a:chExt cx="0" cy="0"/>
         </a:xfrm>
       </p:grpSpPr>
-      <p:pic>
-        <p:nvPicPr>
-          <p:cNvPr id="5" name="Picture 4">
-            <a:extLst>
-              <a:ext uri="{FF2B5EF4-FFF2-40B4-BE49-F238E27FC236}">
-                <a16:creationId xmlns:a16="http://schemas.microsoft.com/office/drawing/2014/main" id="{96C93B6D-8386-4E8B-B108-CCD626D6BA9E}"/>
-              </a:ext>
-            </a:extLst>
-          </p:cNvPr>
-          <p:cNvPicPr>
-            <a:picLocks noChangeAspect="1"/>
-          </p:cNvPicPr>
-          <p:nvPr/>
-        </p:nvPicPr>
-        <p:blipFill>
-          <a:blip r:embed="rId2"/>
-          <a:srcRect/>
-          <a:stretch/>
-        </p:blipFill>
-        <p:spPr>
-          <a:xfrm>
-            <a:off x="540275" y="3162925"/>
-            <a:ext cx="5403328" cy="3602219"/>
-          </a:xfrm>
-          <a:prstGeom prst="rect">
-            <a:avLst/>
-          </a:prstGeom>
-        </p:spPr>
-      </p:pic>
-      <p:pic>
-        <p:nvPicPr>
-          <p:cNvPr id="7" name="Picture 6">
-            <a:extLst>
-              <a:ext uri="{FF2B5EF4-FFF2-40B4-BE49-F238E27FC236}">
-                <a16:creationId xmlns:a16="http://schemas.microsoft.com/office/drawing/2014/main" id="{B983555D-C4C1-4ED1-C834-02D1AFE82779}"/>
-              </a:ext>
-            </a:extLst>
-          </p:cNvPr>
-          <p:cNvPicPr>
-            <a:picLocks noChangeAspect="1"/>
-          </p:cNvPicPr>
-          <p:nvPr/>
-        </p:nvPicPr>
-        <p:blipFill>
-          <a:blip r:embed="rId3"/>
-          <a:srcRect/>
-          <a:stretch/>
-        </p:blipFill>
-        <p:spPr>
-          <a:xfrm>
-            <a:off x="540276" y="0"/>
-            <a:ext cx="5403327" cy="3602218"/>
-          </a:xfrm>
-          <a:prstGeom prst="rect">
-            <a:avLst/>
-          </a:prstGeom>
-        </p:spPr>
-      </p:pic>
       <p:sp>
         <p:nvSpPr>
           <p:cNvPr id="8" name="TextBox 7">
@@ -3076,8 +3156,8 @@
         </p:nvSpPr>
         <p:spPr>
           <a:xfrm rot="16200000">
-            <a:off x="-1561054" y="3878052"/>
-            <a:ext cx="3612630" cy="307777"/>
+            <a:off x="-761177" y="4833957"/>
+            <a:ext cx="2109040" cy="307777"/>
           </a:xfrm>
           <a:prstGeom prst="rect">
             <a:avLst/>
@@ -3100,6 +3180,400 @@
           </a:p>
         </p:txBody>
       </p:sp>
+      <p:sp>
+        <p:nvSpPr>
+          <p:cNvPr id="2" name="Rectangle 1">
+            <a:extLst>
+              <a:ext uri="{FF2B5EF4-FFF2-40B4-BE49-F238E27FC236}">
+                <a16:creationId xmlns:a16="http://schemas.microsoft.com/office/drawing/2014/main" id="{D45A72B1-F09E-1229-080E-261C06F12AF1}"/>
+              </a:ext>
+            </a:extLst>
+          </p:cNvPr>
+          <p:cNvSpPr/>
+          <p:nvPr/>
+        </p:nvSpPr>
+        <p:spPr>
+          <a:xfrm>
+            <a:off x="866056" y="231868"/>
+            <a:ext cx="145042" cy="157887"/>
+          </a:xfrm>
+          <a:prstGeom prst="rect">
+            <a:avLst/>
+          </a:prstGeom>
+          <a:solidFill>
+            <a:srgbClr val="B4696B"/>
+          </a:solidFill>
+        </p:spPr>
+        <p:style>
+          <a:lnRef idx="2">
+            <a:schemeClr val="accent1">
+              <a:shade val="15000"/>
+            </a:schemeClr>
+          </a:lnRef>
+          <a:fillRef idx="1">
+            <a:schemeClr val="accent1"/>
+          </a:fillRef>
+          <a:effectRef idx="0">
+            <a:schemeClr val="accent1"/>
+          </a:effectRef>
+          <a:fontRef idx="minor">
+            <a:schemeClr val="lt1"/>
+          </a:fontRef>
+        </p:style>
+        <p:txBody>
+          <a:bodyPr rtlCol="0" anchor="ctr"/>
+          <a:lstStyle/>
+          <a:p>
+            <a:pPr algn="ctr"/>
+            <a:endParaRPr lang="en-US"/>
+          </a:p>
+        </p:txBody>
+      </p:sp>
+      <p:sp>
+        <p:nvSpPr>
+          <p:cNvPr id="3" name="Rectangle 2">
+            <a:extLst>
+              <a:ext uri="{FF2B5EF4-FFF2-40B4-BE49-F238E27FC236}">
+                <a16:creationId xmlns:a16="http://schemas.microsoft.com/office/drawing/2014/main" id="{3857E740-F449-4C25-0C7A-02E0BF20AB3E}"/>
+              </a:ext>
+            </a:extLst>
+          </p:cNvPr>
+          <p:cNvSpPr/>
+          <p:nvPr/>
+        </p:nvSpPr>
+        <p:spPr>
+          <a:xfrm>
+            <a:off x="1833530" y="231868"/>
+            <a:ext cx="145042" cy="157887"/>
+          </a:xfrm>
+          <a:prstGeom prst="rect">
+            <a:avLst/>
+          </a:prstGeom>
+          <a:solidFill>
+            <a:srgbClr val="E9D279"/>
+          </a:solidFill>
+        </p:spPr>
+        <p:style>
+          <a:lnRef idx="2">
+            <a:schemeClr val="accent1">
+              <a:shade val="15000"/>
+            </a:schemeClr>
+          </a:lnRef>
+          <a:fillRef idx="1">
+            <a:schemeClr val="accent1"/>
+          </a:fillRef>
+          <a:effectRef idx="0">
+            <a:schemeClr val="accent1"/>
+          </a:effectRef>
+          <a:fontRef idx="minor">
+            <a:schemeClr val="lt1"/>
+          </a:fontRef>
+        </p:style>
+        <p:txBody>
+          <a:bodyPr rtlCol="0" anchor="ctr"/>
+          <a:lstStyle/>
+          <a:p>
+            <a:pPr algn="ctr"/>
+            <a:endParaRPr lang="en-US"/>
+          </a:p>
+        </p:txBody>
+      </p:sp>
+      <p:sp>
+        <p:nvSpPr>
+          <p:cNvPr id="4" name="Rectangle 3">
+            <a:extLst>
+              <a:ext uri="{FF2B5EF4-FFF2-40B4-BE49-F238E27FC236}">
+                <a16:creationId xmlns:a16="http://schemas.microsoft.com/office/drawing/2014/main" id="{BABD0BC2-46BA-FA4E-AE19-E555B721AA7F}"/>
+              </a:ext>
+            </a:extLst>
+          </p:cNvPr>
+          <p:cNvSpPr/>
+          <p:nvPr/>
+        </p:nvSpPr>
+        <p:spPr>
+          <a:xfrm>
+            <a:off x="3186738" y="231868"/>
+            <a:ext cx="145042" cy="157887"/>
+          </a:xfrm>
+          <a:prstGeom prst="rect">
+            <a:avLst/>
+          </a:prstGeom>
+          <a:solidFill>
+            <a:srgbClr val="7E9FC1"/>
+          </a:solidFill>
+        </p:spPr>
+        <p:style>
+          <a:lnRef idx="2">
+            <a:schemeClr val="accent1">
+              <a:shade val="15000"/>
+            </a:schemeClr>
+          </a:lnRef>
+          <a:fillRef idx="1">
+            <a:schemeClr val="accent1"/>
+          </a:fillRef>
+          <a:effectRef idx="0">
+            <a:schemeClr val="accent1"/>
+          </a:effectRef>
+          <a:fontRef idx="minor">
+            <a:schemeClr val="lt1"/>
+          </a:fontRef>
+        </p:style>
+        <p:txBody>
+          <a:bodyPr rtlCol="0" anchor="ctr"/>
+          <a:lstStyle/>
+          <a:p>
+            <a:pPr algn="ctr"/>
+            <a:endParaRPr lang="en-US"/>
+          </a:p>
+        </p:txBody>
+      </p:sp>
+      <p:sp>
+        <p:nvSpPr>
+          <p:cNvPr id="6" name="Rectangle 5">
+            <a:extLst>
+              <a:ext uri="{FF2B5EF4-FFF2-40B4-BE49-F238E27FC236}">
+                <a16:creationId xmlns:a16="http://schemas.microsoft.com/office/drawing/2014/main" id="{02B19EA6-0C8A-8231-C3EC-8E1E55F52666}"/>
+              </a:ext>
+            </a:extLst>
+          </p:cNvPr>
+          <p:cNvSpPr/>
+          <p:nvPr/>
+        </p:nvSpPr>
+        <p:spPr>
+          <a:xfrm>
+            <a:off x="3978157" y="231868"/>
+            <a:ext cx="145042" cy="157887"/>
+          </a:xfrm>
+          <a:prstGeom prst="rect">
+            <a:avLst/>
+          </a:prstGeom>
+          <a:solidFill>
+            <a:srgbClr val="8DB5AD"/>
+          </a:solidFill>
+        </p:spPr>
+        <p:style>
+          <a:lnRef idx="2">
+            <a:schemeClr val="accent1">
+              <a:shade val="15000"/>
+            </a:schemeClr>
+          </a:lnRef>
+          <a:fillRef idx="1">
+            <a:schemeClr val="accent1"/>
+          </a:fillRef>
+          <a:effectRef idx="0">
+            <a:schemeClr val="accent1"/>
+          </a:effectRef>
+          <a:fontRef idx="minor">
+            <a:schemeClr val="lt1"/>
+          </a:fontRef>
+        </p:style>
+        <p:txBody>
+          <a:bodyPr rtlCol="0" anchor="ctr"/>
+          <a:lstStyle/>
+          <a:p>
+            <a:pPr algn="ctr"/>
+            <a:endParaRPr lang="en-US"/>
+          </a:p>
+        </p:txBody>
+      </p:sp>
+      <p:sp>
+        <p:nvSpPr>
+          <p:cNvPr id="10" name="TextBox 9">
+            <a:extLst>
+              <a:ext uri="{FF2B5EF4-FFF2-40B4-BE49-F238E27FC236}">
+                <a16:creationId xmlns:a16="http://schemas.microsoft.com/office/drawing/2014/main" id="{CB68924B-507D-6D50-CF7C-ABD9057C0FBC}"/>
+              </a:ext>
+            </a:extLst>
+          </p:cNvPr>
+          <p:cNvSpPr txBox="1"/>
+          <p:nvPr/>
+        </p:nvSpPr>
+        <p:spPr>
+          <a:xfrm>
+            <a:off x="948040" y="180006"/>
+            <a:ext cx="739930" cy="261610"/>
+          </a:xfrm>
+          <a:prstGeom prst="rect">
+            <a:avLst/>
+          </a:prstGeom>
+          <a:noFill/>
+        </p:spPr>
+        <p:txBody>
+          <a:bodyPr wrap="square" rtlCol="0">
+            <a:spAutoFit/>
+          </a:bodyPr>
+          <a:lstStyle/>
+          <a:p>
+            <a:r>
+              <a:rPr lang="en-US" sz="1100" dirty="0"/>
+              <a:t>High R!=0</a:t>
+            </a:r>
+          </a:p>
+        </p:txBody>
+      </p:sp>
+      <p:sp>
+        <p:nvSpPr>
+          <p:cNvPr id="11" name="TextBox 10">
+            <a:extLst>
+              <a:ext uri="{FF2B5EF4-FFF2-40B4-BE49-F238E27FC236}">
+                <a16:creationId xmlns:a16="http://schemas.microsoft.com/office/drawing/2014/main" id="{FB8D91D6-2443-B48E-02E1-E5E098B98D8A}"/>
+              </a:ext>
+            </a:extLst>
+          </p:cNvPr>
+          <p:cNvSpPr txBox="1"/>
+          <p:nvPr/>
+        </p:nvSpPr>
+        <p:spPr>
+          <a:xfrm>
+            <a:off x="1978572" y="180006"/>
+            <a:ext cx="1306962" cy="261610"/>
+          </a:xfrm>
+          <a:prstGeom prst="rect">
+            <a:avLst/>
+          </a:prstGeom>
+          <a:noFill/>
+        </p:spPr>
+        <p:txBody>
+          <a:bodyPr wrap="square" rtlCol="0">
+            <a:spAutoFit/>
+          </a:bodyPr>
+          <a:lstStyle/>
+          <a:p>
+            <a:r>
+              <a:rPr lang="en-US" sz="1100" dirty="0"/>
+              <a:t>High R=0, high F</a:t>
+            </a:r>
+          </a:p>
+        </p:txBody>
+      </p:sp>
+      <p:sp>
+        <p:nvSpPr>
+          <p:cNvPr id="12" name="TextBox 11">
+            <a:extLst>
+              <a:ext uri="{FF2B5EF4-FFF2-40B4-BE49-F238E27FC236}">
+                <a16:creationId xmlns:a16="http://schemas.microsoft.com/office/drawing/2014/main" id="{A8CD4B46-A735-6B7B-9FF5-6CB605A00BB1}"/>
+              </a:ext>
+            </a:extLst>
+          </p:cNvPr>
+          <p:cNvSpPr txBox="1"/>
+          <p:nvPr/>
+        </p:nvSpPr>
+        <p:spPr>
+          <a:xfrm>
+            <a:off x="3296562" y="180006"/>
+            <a:ext cx="739930" cy="261610"/>
+          </a:xfrm>
+          <a:prstGeom prst="rect">
+            <a:avLst/>
+          </a:prstGeom>
+          <a:noFill/>
+        </p:spPr>
+        <p:txBody>
+          <a:bodyPr wrap="square" rtlCol="0">
+            <a:spAutoFit/>
+          </a:bodyPr>
+          <a:lstStyle/>
+          <a:p>
+            <a:r>
+              <a:rPr lang="en-US" sz="1100" dirty="0"/>
+              <a:t>Low R</a:t>
+            </a:r>
+          </a:p>
+        </p:txBody>
+      </p:sp>
+      <p:sp>
+        <p:nvSpPr>
+          <p:cNvPr id="13" name="TextBox 12">
+            <a:extLst>
+              <a:ext uri="{FF2B5EF4-FFF2-40B4-BE49-F238E27FC236}">
+                <a16:creationId xmlns:a16="http://schemas.microsoft.com/office/drawing/2014/main" id="{D681817D-6669-9E93-2EBB-99D6AFAE06D6}"/>
+              </a:ext>
+            </a:extLst>
+          </p:cNvPr>
+          <p:cNvSpPr txBox="1"/>
+          <p:nvPr/>
+        </p:nvSpPr>
+        <p:spPr>
+          <a:xfrm>
+            <a:off x="4100067" y="180006"/>
+            <a:ext cx="739930" cy="261610"/>
+          </a:xfrm>
+          <a:prstGeom prst="rect">
+            <a:avLst/>
+          </a:prstGeom>
+          <a:noFill/>
+        </p:spPr>
+        <p:txBody>
+          <a:bodyPr wrap="square" rtlCol="0">
+            <a:spAutoFit/>
+          </a:bodyPr>
+          <a:lstStyle/>
+          <a:p>
+            <a:r>
+              <a:rPr lang="en-US" sz="1100" dirty="0"/>
+              <a:t>controls</a:t>
+            </a:r>
+          </a:p>
+        </p:txBody>
+      </p:sp>
+      <p:pic>
+        <p:nvPicPr>
+          <p:cNvPr id="15" name="Picture 14">
+            <a:extLst>
+              <a:ext uri="{FF2B5EF4-FFF2-40B4-BE49-F238E27FC236}">
+                <a16:creationId xmlns:a16="http://schemas.microsoft.com/office/drawing/2014/main" id="{887A525F-6CE8-90C6-7130-D68CCA53E1B9}"/>
+              </a:ext>
+            </a:extLst>
+          </p:cNvPr>
+          <p:cNvPicPr>
+            <a:picLocks noChangeAspect="1"/>
+          </p:cNvPicPr>
+          <p:nvPr/>
+        </p:nvPicPr>
+        <p:blipFill rotWithShape="1">
+          <a:blip r:embed="rId2"/>
+          <a:srcRect t="13863"/>
+          <a:stretch/>
+        </p:blipFill>
+        <p:spPr>
+          <a:xfrm>
+            <a:off x="540275" y="493477"/>
+            <a:ext cx="5517625" cy="3168475"/>
+          </a:xfrm>
+          <a:prstGeom prst="rect">
+            <a:avLst/>
+          </a:prstGeom>
+        </p:spPr>
+      </p:pic>
+      <p:pic>
+        <p:nvPicPr>
+          <p:cNvPr id="17" name="Picture 16">
+            <a:extLst>
+              <a:ext uri="{FF2B5EF4-FFF2-40B4-BE49-F238E27FC236}">
+                <a16:creationId xmlns:a16="http://schemas.microsoft.com/office/drawing/2014/main" id="{250CF919-8366-1AFF-12B2-4D2192EC2603}"/>
+              </a:ext>
+            </a:extLst>
+          </p:cNvPr>
+          <p:cNvPicPr>
+            <a:picLocks noChangeAspect="1"/>
+          </p:cNvPicPr>
+          <p:nvPr/>
+        </p:nvPicPr>
+        <p:blipFill rotWithShape="1">
+          <a:blip r:embed="rId3"/>
+          <a:srcRect t="12373"/>
+          <a:stretch/>
+        </p:blipFill>
+        <p:spPr>
+          <a:xfrm>
+            <a:off x="540275" y="3591377"/>
+            <a:ext cx="5591773" cy="3266623"/>
+          </a:xfrm>
+          <a:prstGeom prst="rect">
+            <a:avLst/>
+          </a:prstGeom>
+        </p:spPr>
+      </p:pic>
     </p:spTree>
     <p:extLst>
       <p:ext uri="{BB962C8B-B14F-4D97-AF65-F5344CB8AC3E}">

</xml_diff>